<commit_message>
Add MOD04 Introduccion a OOP
</commit_message>
<xml_diff>
--- a/M03_Algoritmos_de_ordenamiento_y_busqueda/01 Presentacion/M03_PPT-Ordenamiento_y_Busqueda.pptx
+++ b/M03_Algoritmos_de_ordenamiento_y_busqueda/01 Presentacion/M03_PPT-Ordenamiento_y_Busqueda.pptx
@@ -265,7 +265,7 @@
           <a:p>
             <a:fld id="{502DC4F2-4218-4162-BA3D-B14DE8F619FF}" type="datetimeFigureOut">
               <a:rPr lang="en-US" smtClean="0"/>
-              <a:t>1/29/2021</a:t>
+              <a:t>1/30/2022</a:t>
             </a:fld>
             <a:endParaRPr lang="en-US"/>
           </a:p>
@@ -5190,9 +5190,10 @@
           <a:p>
             <a:pPr eaLnBrk="1" hangingPunct="1"/>
             <a:r>
-              <a:rPr lang="es-MX" altLang="en-US" b="1" dirty="0"/>
-              <a:t>Módulo 2</a:t>
-            </a:r>
+              <a:rPr lang="es-MX" altLang="en-US" b="1"/>
+              <a:t>Módulo 3</a:t>
+            </a:r>
+            <a:endParaRPr lang="es-MX" altLang="en-US" b="1" dirty="0"/>
           </a:p>
           <a:p>
             <a:pPr eaLnBrk="1" hangingPunct="1"/>

</xml_diff>